<commit_message>
renamed files and thesis update
</commit_message>
<xml_diff>
--- a/Synhronous motor/Matlab/Time_Domain_Carrier_phase_shift/CPS.pptx
+++ b/Synhronous motor/Matlab/Time_Domain_Carrier_phase_shift/CPS.pptx
@@ -5,7 +5,7 @@
     <p:sldMasterId id="2147483648" r:id="rId1"/>
   </p:sldMasterIdLst>
   <p:notesMasterIdLst>
-    <p:notesMasterId r:id="rId14"/>
+    <p:notesMasterId r:id="rId15"/>
   </p:notesMasterIdLst>
   <p:sldIdLst>
     <p:sldId id="267" r:id="rId2"/>
@@ -19,7 +19,8 @@
     <p:sldId id="259" r:id="rId10"/>
     <p:sldId id="262" r:id="rId11"/>
     <p:sldId id="260" r:id="rId12"/>
-    <p:sldId id="257" r:id="rId13"/>
+    <p:sldId id="268" r:id="rId13"/>
+    <p:sldId id="257" r:id="rId14"/>
   </p:sldIdLst>
   <p:sldSz cx="12192000" cy="6858000"/>
   <p:notesSz cx="6858000" cy="9144000"/>
@@ -220,7 +221,7 @@
           <a:p>
             <a:fld id="{28B67866-21BA-4CA6-832C-195CC621F675}" type="datetimeFigureOut">
               <a:rPr lang="en-US" smtClean="0"/>
-              <a:t>8/10/2022</a:t>
+              <a:t>8/22/2022</a:t>
             </a:fld>
             <a:endParaRPr lang="en-US"/>
           </a:p>
@@ -809,7 +810,7 @@
           <a:p>
             <a:fld id="{8DDB1700-4475-4CBC-B86D-A53CA45E6D33}" type="datetimeFigureOut">
               <a:rPr lang="en-US" smtClean="0"/>
-              <a:t>8/10/2022</a:t>
+              <a:t>8/22/2022</a:t>
             </a:fld>
             <a:endParaRPr lang="en-US"/>
           </a:p>
@@ -1007,7 +1008,7 @@
           <a:p>
             <a:fld id="{8DDB1700-4475-4CBC-B86D-A53CA45E6D33}" type="datetimeFigureOut">
               <a:rPr lang="en-US" smtClean="0"/>
-              <a:t>8/10/2022</a:t>
+              <a:t>8/22/2022</a:t>
             </a:fld>
             <a:endParaRPr lang="en-US"/>
           </a:p>
@@ -1215,7 +1216,7 @@
           <a:p>
             <a:fld id="{8DDB1700-4475-4CBC-B86D-A53CA45E6D33}" type="datetimeFigureOut">
               <a:rPr lang="en-US" smtClean="0"/>
-              <a:t>8/10/2022</a:t>
+              <a:t>8/22/2022</a:t>
             </a:fld>
             <a:endParaRPr lang="en-US"/>
           </a:p>
@@ -1413,7 +1414,7 @@
           <a:p>
             <a:fld id="{8DDB1700-4475-4CBC-B86D-A53CA45E6D33}" type="datetimeFigureOut">
               <a:rPr lang="en-US" smtClean="0"/>
-              <a:t>8/10/2022</a:t>
+              <a:t>8/22/2022</a:t>
             </a:fld>
             <a:endParaRPr lang="en-US"/>
           </a:p>
@@ -1688,7 +1689,7 @@
           <a:p>
             <a:fld id="{8DDB1700-4475-4CBC-B86D-A53CA45E6D33}" type="datetimeFigureOut">
               <a:rPr lang="en-US" smtClean="0"/>
-              <a:t>8/10/2022</a:t>
+              <a:t>8/22/2022</a:t>
             </a:fld>
             <a:endParaRPr lang="en-US"/>
           </a:p>
@@ -1953,7 +1954,7 @@
           <a:p>
             <a:fld id="{8DDB1700-4475-4CBC-B86D-A53CA45E6D33}" type="datetimeFigureOut">
               <a:rPr lang="en-US" smtClean="0"/>
-              <a:t>8/10/2022</a:t>
+              <a:t>8/22/2022</a:t>
             </a:fld>
             <a:endParaRPr lang="en-US"/>
           </a:p>
@@ -2365,7 +2366,7 @@
           <a:p>
             <a:fld id="{8DDB1700-4475-4CBC-B86D-A53CA45E6D33}" type="datetimeFigureOut">
               <a:rPr lang="en-US" smtClean="0"/>
-              <a:t>8/10/2022</a:t>
+              <a:t>8/22/2022</a:t>
             </a:fld>
             <a:endParaRPr lang="en-US"/>
           </a:p>
@@ -2506,7 +2507,7 @@
           <a:p>
             <a:fld id="{8DDB1700-4475-4CBC-B86D-A53CA45E6D33}" type="datetimeFigureOut">
               <a:rPr lang="en-US" smtClean="0"/>
-              <a:t>8/10/2022</a:t>
+              <a:t>8/22/2022</a:t>
             </a:fld>
             <a:endParaRPr lang="en-US"/>
           </a:p>
@@ -2619,7 +2620,7 @@
           <a:p>
             <a:fld id="{8DDB1700-4475-4CBC-B86D-A53CA45E6D33}" type="datetimeFigureOut">
               <a:rPr lang="en-US" smtClean="0"/>
-              <a:t>8/10/2022</a:t>
+              <a:t>8/22/2022</a:t>
             </a:fld>
             <a:endParaRPr lang="en-US"/>
           </a:p>
@@ -2930,7 +2931,7 @@
           <a:p>
             <a:fld id="{8DDB1700-4475-4CBC-B86D-A53CA45E6D33}" type="datetimeFigureOut">
               <a:rPr lang="en-US" smtClean="0"/>
-              <a:t>8/10/2022</a:t>
+              <a:t>8/22/2022</a:t>
             </a:fld>
             <a:endParaRPr lang="en-US"/>
           </a:p>
@@ -3218,7 +3219,7 @@
           <a:p>
             <a:fld id="{8DDB1700-4475-4CBC-B86D-A53CA45E6D33}" type="datetimeFigureOut">
               <a:rPr lang="en-US" smtClean="0"/>
-              <a:t>8/10/2022</a:t>
+              <a:t>8/22/2022</a:t>
             </a:fld>
             <a:endParaRPr lang="en-US"/>
           </a:p>
@@ -3459,7 +3460,7 @@
           <a:p>
             <a:fld id="{8DDB1700-4475-4CBC-B86D-A53CA45E6D33}" type="datetimeFigureOut">
               <a:rPr lang="en-US" smtClean="0"/>
-              <a:t>8/10/2022</a:t>
+              <a:t>8/22/2022</a:t>
             </a:fld>
             <a:endParaRPr lang="en-US"/>
           </a:p>
@@ -4074,8 +4075,8 @@
           </p:style>
         </p:cxnSp>
       </p:grpSp>
-      <mc:AlternateContent xmlns:mc="http://schemas.openxmlformats.org/markup-compatibility/2006">
-        <mc:Choice xmlns:a14="http://schemas.microsoft.com/office/drawing/2010/main" Requires="a14">
+      <mc:AlternateContent xmlns:mc="http://schemas.openxmlformats.org/markup-compatibility/2006" xmlns:a14="http://schemas.microsoft.com/office/drawing/2010/main">
+        <mc:Choice Requires="a14">
           <p:sp>
             <p:nvSpPr>
               <p:cNvPr id="17" name="TextBox 16">
@@ -4104,6 +4105,7 @@
               </a:bodyPr>
               <a:lstStyle/>
               <a:p>
+                <a:pPr/>
                 <a14:m>
                   <m:oMathPara xmlns:m="http://schemas.openxmlformats.org/officeDocument/2006/math">
                     <m:oMathParaPr>
@@ -4180,7 +4182,7 @@
             </p:txBody>
           </p:sp>
         </mc:Choice>
-        <mc:Fallback>
+        <mc:Fallback xmlns="">
           <p:sp>
             <p:nvSpPr>
               <p:cNvPr id="17" name="TextBox 16">
@@ -4285,8 +4287,8 @@
           </a:prstGeom>
         </p:spPr>
       </p:pic>
-      <mc:AlternateContent xmlns:mc="http://schemas.openxmlformats.org/markup-compatibility/2006">
-        <mc:Choice xmlns:a14="http://schemas.microsoft.com/office/drawing/2010/main" Requires="a14">
+      <mc:AlternateContent xmlns:mc="http://schemas.openxmlformats.org/markup-compatibility/2006" xmlns:a14="http://schemas.microsoft.com/office/drawing/2010/main">
+        <mc:Choice Requires="a14">
           <p:sp>
             <p:nvSpPr>
               <p:cNvPr id="27" name="TextBox 26">
@@ -4315,6 +4317,7 @@
               </a:bodyPr>
               <a:lstStyle/>
               <a:p>
+                <a:pPr/>
                 <a14:m>
                   <m:oMathPara xmlns:m="http://schemas.openxmlformats.org/officeDocument/2006/math">
                     <m:oMathParaPr>
@@ -4335,7 +4338,7 @@
             </p:txBody>
           </p:sp>
         </mc:Choice>
-        <mc:Fallback>
+        <mc:Fallback xmlns="">
           <p:sp>
             <p:nvSpPr>
               <p:cNvPr id="27" name="TextBox 26">
@@ -4380,8 +4383,8 @@
           </p:sp>
         </mc:Fallback>
       </mc:AlternateContent>
-      <mc:AlternateContent xmlns:mc="http://schemas.openxmlformats.org/markup-compatibility/2006">
-        <mc:Choice xmlns:a14="http://schemas.microsoft.com/office/drawing/2010/main" Requires="a14">
+      <mc:AlternateContent xmlns:mc="http://schemas.openxmlformats.org/markup-compatibility/2006" xmlns:a14="http://schemas.microsoft.com/office/drawing/2010/main">
+        <mc:Choice Requires="a14">
           <p:sp>
             <p:nvSpPr>
               <p:cNvPr id="28" name="TextBox 27">
@@ -4410,6 +4413,7 @@
               </a:bodyPr>
               <a:lstStyle/>
               <a:p>
+                <a:pPr/>
                 <a14:m>
                   <m:oMathPara xmlns:m="http://schemas.openxmlformats.org/officeDocument/2006/math">
                     <m:oMathParaPr>
@@ -4492,7 +4496,7 @@
             </p:txBody>
           </p:sp>
         </mc:Choice>
-        <mc:Fallback>
+        <mc:Fallback xmlns="">
           <p:sp>
             <p:nvSpPr>
               <p:cNvPr id="28" name="TextBox 27">
@@ -4537,8 +4541,8 @@
           </p:sp>
         </mc:Fallback>
       </mc:AlternateContent>
-      <mc:AlternateContent xmlns:mc="http://schemas.openxmlformats.org/markup-compatibility/2006">
-        <mc:Choice xmlns:a14="http://schemas.microsoft.com/office/drawing/2010/main" Requires="a14">
+      <mc:AlternateContent xmlns:mc="http://schemas.openxmlformats.org/markup-compatibility/2006" xmlns:a14="http://schemas.microsoft.com/office/drawing/2010/main">
+        <mc:Choice Requires="a14">
           <p:sp>
             <p:nvSpPr>
               <p:cNvPr id="29" name="TextBox 28">
@@ -4567,6 +4571,7 @@
               </a:bodyPr>
               <a:lstStyle/>
               <a:p>
+                <a:pPr/>
                 <a14:m>
                   <m:oMathPara xmlns:m="http://schemas.openxmlformats.org/officeDocument/2006/math">
                     <m:oMathParaPr>
@@ -4643,7 +4648,7 @@
             </p:txBody>
           </p:sp>
         </mc:Choice>
-        <mc:Fallback>
+        <mc:Fallback xmlns="">
           <p:sp>
             <p:nvSpPr>
               <p:cNvPr id="29" name="TextBox 28">
@@ -4740,8 +4745,8 @@
           </a:p>
         </p:txBody>
       </p:sp>
-      <mc:AlternateContent xmlns:mc="http://schemas.openxmlformats.org/markup-compatibility/2006">
-        <mc:Choice xmlns:a14="http://schemas.microsoft.com/office/drawing/2010/main" Requires="a14">
+      <mc:AlternateContent xmlns:mc="http://schemas.openxmlformats.org/markup-compatibility/2006" xmlns:a14="http://schemas.microsoft.com/office/drawing/2010/main">
+        <mc:Choice Requires="a14">
           <p:sp>
             <p:nvSpPr>
               <p:cNvPr id="33" name="TextBox 32">
@@ -4770,6 +4775,7 @@
               </a:bodyPr>
               <a:lstStyle/>
               <a:p>
+                <a:pPr/>
                 <a14:m>
                   <m:oMathPara xmlns:m="http://schemas.openxmlformats.org/officeDocument/2006/math">
                     <m:oMathParaPr>
@@ -4846,7 +4852,7 @@
             </p:txBody>
           </p:sp>
         </mc:Choice>
-        <mc:Fallback>
+        <mc:Fallback xmlns="">
           <p:sp>
             <p:nvSpPr>
               <p:cNvPr id="33" name="TextBox 32">
@@ -4984,8 +4990,8 @@
           </a:p>
         </p:txBody>
       </p:sp>
-      <mc:AlternateContent xmlns:mc="http://schemas.openxmlformats.org/markup-compatibility/2006">
-        <mc:Choice xmlns:a14="http://schemas.microsoft.com/office/drawing/2010/main" Requires="a14">
+      <mc:AlternateContent xmlns:mc="http://schemas.openxmlformats.org/markup-compatibility/2006" xmlns:a14="http://schemas.microsoft.com/office/drawing/2010/main">
+        <mc:Choice Requires="a14">
           <p:sp>
             <p:nvSpPr>
               <p:cNvPr id="37" name="TextBox 36">
@@ -5014,6 +5020,7 @@
               </a:bodyPr>
               <a:lstStyle/>
               <a:p>
+                <a:pPr/>
                 <a14:m>
                   <m:oMathPara xmlns:m="http://schemas.openxmlformats.org/officeDocument/2006/math">
                     <m:oMathParaPr>
@@ -5034,7 +5041,7 @@
             </p:txBody>
           </p:sp>
         </mc:Choice>
-        <mc:Fallback>
+        <mc:Fallback xmlns="">
           <p:sp>
             <p:nvSpPr>
               <p:cNvPr id="37" name="TextBox 36">
@@ -5079,8 +5086,8 @@
           </p:sp>
         </mc:Fallback>
       </mc:AlternateContent>
-      <mc:AlternateContent xmlns:mc="http://schemas.openxmlformats.org/markup-compatibility/2006">
-        <mc:Choice xmlns:a14="http://schemas.microsoft.com/office/drawing/2010/main" Requires="a14">
+      <mc:AlternateContent xmlns:mc="http://schemas.openxmlformats.org/markup-compatibility/2006" xmlns:a14="http://schemas.microsoft.com/office/drawing/2010/main">
+        <mc:Choice Requires="a14">
           <p:sp>
             <p:nvSpPr>
               <p:cNvPr id="38" name="TextBox 37">
@@ -5109,6 +5116,7 @@
               </a:bodyPr>
               <a:lstStyle/>
               <a:p>
+                <a:pPr/>
                 <a14:m>
                   <m:oMathPara xmlns:m="http://schemas.openxmlformats.org/officeDocument/2006/math">
                     <m:oMathParaPr>
@@ -5129,7 +5137,7 @@
             </p:txBody>
           </p:sp>
         </mc:Choice>
-        <mc:Fallback>
+        <mc:Fallback xmlns="">
           <p:sp>
             <p:nvSpPr>
               <p:cNvPr id="38" name="TextBox 37">
@@ -5269,8 +5277,8 @@
           </a:p>
         </p:txBody>
       </p:sp>
-      <mc:AlternateContent xmlns:mc="http://schemas.openxmlformats.org/markup-compatibility/2006">
-        <mc:Choice xmlns:a14="http://schemas.microsoft.com/office/drawing/2010/main" Requires="a14">
+      <mc:AlternateContent xmlns:mc="http://schemas.openxmlformats.org/markup-compatibility/2006" xmlns:a14="http://schemas.microsoft.com/office/drawing/2010/main">
+        <mc:Choice Requires="a14">
           <p:sp>
             <p:nvSpPr>
               <p:cNvPr id="49" name="TextBox 48">
@@ -5299,6 +5307,7 @@
               </a:bodyPr>
               <a:lstStyle/>
               <a:p>
+                <a:pPr/>
                 <a14:m>
                   <m:oMathPara xmlns:m="http://schemas.openxmlformats.org/officeDocument/2006/math">
                     <m:oMathParaPr>
@@ -5405,7 +5414,7 @@
             </p:txBody>
           </p:sp>
         </mc:Choice>
-        <mc:Fallback>
+        <mc:Fallback xmlns="">
           <p:sp>
             <p:nvSpPr>
               <p:cNvPr id="49" name="TextBox 48">
@@ -5450,8 +5459,8 @@
           </p:sp>
         </mc:Fallback>
       </mc:AlternateContent>
-      <mc:AlternateContent xmlns:mc="http://schemas.openxmlformats.org/markup-compatibility/2006">
-        <mc:Choice xmlns:a14="http://schemas.microsoft.com/office/drawing/2010/main" Requires="a14">
+      <mc:AlternateContent xmlns:mc="http://schemas.openxmlformats.org/markup-compatibility/2006" xmlns:a14="http://schemas.microsoft.com/office/drawing/2010/main">
+        <mc:Choice Requires="a14">
           <p:sp>
             <p:nvSpPr>
               <p:cNvPr id="50" name="TextBox 49">
@@ -5480,6 +5489,7 @@
               </a:bodyPr>
               <a:lstStyle/>
               <a:p>
+                <a:pPr/>
                 <a14:m>
                   <m:oMathPara xmlns:m="http://schemas.openxmlformats.org/officeDocument/2006/math">
                     <m:oMathParaPr>
@@ -5586,7 +5596,7 @@
             </p:txBody>
           </p:sp>
         </mc:Choice>
-        <mc:Fallback>
+        <mc:Fallback xmlns="">
           <p:sp>
             <p:nvSpPr>
               <p:cNvPr id="50" name="TextBox 49">
@@ -5631,8 +5641,8 @@
           </p:sp>
         </mc:Fallback>
       </mc:AlternateContent>
-      <mc:AlternateContent xmlns:mc="http://schemas.openxmlformats.org/markup-compatibility/2006">
-        <mc:Choice xmlns:a14="http://schemas.microsoft.com/office/drawing/2010/main" Requires="a14">
+      <mc:AlternateContent xmlns:mc="http://schemas.openxmlformats.org/markup-compatibility/2006" xmlns:a14="http://schemas.microsoft.com/office/drawing/2010/main">
+        <mc:Choice Requires="a14">
           <p:sp>
             <p:nvSpPr>
               <p:cNvPr id="56" name="TextBox 55">
@@ -5891,7 +5901,7 @@
             </p:txBody>
           </p:sp>
         </mc:Choice>
-        <mc:Fallback>
+        <mc:Fallback xmlns="">
           <p:sp>
             <p:nvSpPr>
               <p:cNvPr id="56" name="TextBox 55">
@@ -6227,8 +6237,8 @@
           </a:fontRef>
         </p:style>
       </p:cxnSp>
-      <mc:AlternateContent xmlns:mc="http://schemas.openxmlformats.org/markup-compatibility/2006">
-        <mc:Choice xmlns:a14="http://schemas.microsoft.com/office/drawing/2010/main" Requires="a14">
+      <mc:AlternateContent xmlns:mc="http://schemas.openxmlformats.org/markup-compatibility/2006" xmlns:a14="http://schemas.microsoft.com/office/drawing/2010/main">
+        <mc:Choice Requires="a14">
           <p:sp>
             <p:nvSpPr>
               <p:cNvPr id="83" name="TextBox 82">
@@ -6479,7 +6489,7 @@
             </p:txBody>
           </p:sp>
         </mc:Choice>
-        <mc:Fallback>
+        <mc:Fallback xmlns="">
           <p:sp>
             <p:nvSpPr>
               <p:cNvPr id="83" name="TextBox 82">
@@ -7159,6 +7169,96 @@
 </file>
 
 <file path=ppt/slides/slide12.xml><?xml version="1.0" encoding="utf-8"?>
+<p:sld xmlns:a="http://schemas.openxmlformats.org/drawingml/2006/main" xmlns:r="http://schemas.openxmlformats.org/officeDocument/2006/relationships" xmlns:p="http://schemas.openxmlformats.org/presentationml/2006/main">
+  <p:cSld>
+    <p:spTree>
+      <p:nvGrpSpPr>
+        <p:cNvPr id="1" name=""/>
+        <p:cNvGrpSpPr/>
+        <p:nvPr/>
+      </p:nvGrpSpPr>
+      <p:grpSpPr>
+        <a:xfrm>
+          <a:off x="0" y="0"/>
+          <a:ext cx="0" cy="0"/>
+          <a:chOff x="0" y="0"/>
+          <a:chExt cx="0" cy="0"/>
+        </a:xfrm>
+      </p:grpSpPr>
+      <p:pic>
+        <p:nvPicPr>
+          <p:cNvPr id="4" name="Picture 3">
+            <a:extLst>
+              <a:ext uri="{FF2B5EF4-FFF2-40B4-BE49-F238E27FC236}">
+                <a16:creationId xmlns:a16="http://schemas.microsoft.com/office/drawing/2014/main" id="{EC80722B-B158-44ED-AB20-6EC8E0A53148}"/>
+              </a:ext>
+            </a:extLst>
+          </p:cNvPr>
+          <p:cNvPicPr>
+            <a:picLocks noChangeAspect="1"/>
+          </p:cNvPicPr>
+          <p:nvPr/>
+        </p:nvPicPr>
+        <p:blipFill>
+          <a:blip r:embed="rId2"/>
+          <a:stretch>
+            <a:fillRect/>
+          </a:stretch>
+        </p:blipFill>
+        <p:spPr>
+          <a:xfrm>
+            <a:off x="762000" y="1668124"/>
+            <a:ext cx="5334000" cy="4000500"/>
+          </a:xfrm>
+          <a:prstGeom prst="rect">
+            <a:avLst/>
+          </a:prstGeom>
+        </p:spPr>
+      </p:pic>
+      <p:pic>
+        <p:nvPicPr>
+          <p:cNvPr id="9" name="Picture 8">
+            <a:extLst>
+              <a:ext uri="{FF2B5EF4-FFF2-40B4-BE49-F238E27FC236}">
+                <a16:creationId xmlns:a16="http://schemas.microsoft.com/office/drawing/2014/main" id="{04510345-9FF7-4244-AA3D-53CE140389D5}"/>
+              </a:ext>
+            </a:extLst>
+          </p:cNvPr>
+          <p:cNvPicPr>
+            <a:picLocks noChangeAspect="1"/>
+          </p:cNvPicPr>
+          <p:nvPr/>
+        </p:nvPicPr>
+        <p:blipFill>
+          <a:blip r:embed="rId3"/>
+          <a:stretch>
+            <a:fillRect/>
+          </a:stretch>
+        </p:blipFill>
+        <p:spPr>
+          <a:xfrm>
+            <a:off x="5749457" y="1668124"/>
+            <a:ext cx="5334000" cy="4000500"/>
+          </a:xfrm>
+          <a:prstGeom prst="rect">
+            <a:avLst/>
+          </a:prstGeom>
+        </p:spPr>
+      </p:pic>
+    </p:spTree>
+    <p:extLst>
+      <p:ext uri="{BB962C8B-B14F-4D97-AF65-F5344CB8AC3E}">
+        <p14:creationId xmlns:p14="http://schemas.microsoft.com/office/powerpoint/2010/main" val="3201812766"/>
+      </p:ext>
+    </p:extLst>
+  </p:cSld>
+  <p:clrMapOvr>
+    <a:masterClrMapping/>
+  </p:clrMapOvr>
+</p:sld>
+</file>
+
+<file path=ppt/slides/slide13.xml><?xml version="1.0" encoding="utf-8"?>
 <p:sld xmlns:a="http://schemas.openxmlformats.org/drawingml/2006/main" xmlns:r="http://schemas.openxmlformats.org/officeDocument/2006/relationships" xmlns:p="http://schemas.openxmlformats.org/presentationml/2006/main">
   <p:cSld>
     <p:spTree>

</xml_diff>

<commit_message>
synchornous motor journal images and codes
</commit_message>
<xml_diff>
--- a/Synhronous motor/Matlab/Time_Domain_Carrier_phase_shift/CPS.pptx
+++ b/Synhronous motor/Matlab/Time_Domain_Carrier_phase_shift/CPS.pptx
@@ -221,7 +221,7 @@
           <a:p>
             <a:fld id="{28B67866-21BA-4CA6-832C-195CC621F675}" type="datetimeFigureOut">
               <a:rPr lang="en-US" smtClean="0"/>
-              <a:t>8/22/2022</a:t>
+              <a:t>9/12/2022</a:t>
             </a:fld>
             <a:endParaRPr lang="en-US"/>
           </a:p>
@@ -810,7 +810,7 @@
           <a:p>
             <a:fld id="{8DDB1700-4475-4CBC-B86D-A53CA45E6D33}" type="datetimeFigureOut">
               <a:rPr lang="en-US" smtClean="0"/>
-              <a:t>8/22/2022</a:t>
+              <a:t>9/12/2022</a:t>
             </a:fld>
             <a:endParaRPr lang="en-US"/>
           </a:p>
@@ -1008,7 +1008,7 @@
           <a:p>
             <a:fld id="{8DDB1700-4475-4CBC-B86D-A53CA45E6D33}" type="datetimeFigureOut">
               <a:rPr lang="en-US" smtClean="0"/>
-              <a:t>8/22/2022</a:t>
+              <a:t>9/12/2022</a:t>
             </a:fld>
             <a:endParaRPr lang="en-US"/>
           </a:p>
@@ -1216,7 +1216,7 @@
           <a:p>
             <a:fld id="{8DDB1700-4475-4CBC-B86D-A53CA45E6D33}" type="datetimeFigureOut">
               <a:rPr lang="en-US" smtClean="0"/>
-              <a:t>8/22/2022</a:t>
+              <a:t>9/12/2022</a:t>
             </a:fld>
             <a:endParaRPr lang="en-US"/>
           </a:p>
@@ -1414,7 +1414,7 @@
           <a:p>
             <a:fld id="{8DDB1700-4475-4CBC-B86D-A53CA45E6D33}" type="datetimeFigureOut">
               <a:rPr lang="en-US" smtClean="0"/>
-              <a:t>8/22/2022</a:t>
+              <a:t>9/12/2022</a:t>
             </a:fld>
             <a:endParaRPr lang="en-US"/>
           </a:p>
@@ -1689,7 +1689,7 @@
           <a:p>
             <a:fld id="{8DDB1700-4475-4CBC-B86D-A53CA45E6D33}" type="datetimeFigureOut">
               <a:rPr lang="en-US" smtClean="0"/>
-              <a:t>8/22/2022</a:t>
+              <a:t>9/12/2022</a:t>
             </a:fld>
             <a:endParaRPr lang="en-US"/>
           </a:p>
@@ -1954,7 +1954,7 @@
           <a:p>
             <a:fld id="{8DDB1700-4475-4CBC-B86D-A53CA45E6D33}" type="datetimeFigureOut">
               <a:rPr lang="en-US" smtClean="0"/>
-              <a:t>8/22/2022</a:t>
+              <a:t>9/12/2022</a:t>
             </a:fld>
             <a:endParaRPr lang="en-US"/>
           </a:p>
@@ -2366,7 +2366,7 @@
           <a:p>
             <a:fld id="{8DDB1700-4475-4CBC-B86D-A53CA45E6D33}" type="datetimeFigureOut">
               <a:rPr lang="en-US" smtClean="0"/>
-              <a:t>8/22/2022</a:t>
+              <a:t>9/12/2022</a:t>
             </a:fld>
             <a:endParaRPr lang="en-US"/>
           </a:p>
@@ -2507,7 +2507,7 @@
           <a:p>
             <a:fld id="{8DDB1700-4475-4CBC-B86D-A53CA45E6D33}" type="datetimeFigureOut">
               <a:rPr lang="en-US" smtClean="0"/>
-              <a:t>8/22/2022</a:t>
+              <a:t>9/12/2022</a:t>
             </a:fld>
             <a:endParaRPr lang="en-US"/>
           </a:p>
@@ -2620,7 +2620,7 @@
           <a:p>
             <a:fld id="{8DDB1700-4475-4CBC-B86D-A53CA45E6D33}" type="datetimeFigureOut">
               <a:rPr lang="en-US" smtClean="0"/>
-              <a:t>8/22/2022</a:t>
+              <a:t>9/12/2022</a:t>
             </a:fld>
             <a:endParaRPr lang="en-US"/>
           </a:p>
@@ -2931,7 +2931,7 @@
           <a:p>
             <a:fld id="{8DDB1700-4475-4CBC-B86D-A53CA45E6D33}" type="datetimeFigureOut">
               <a:rPr lang="en-US" smtClean="0"/>
-              <a:t>8/22/2022</a:t>
+              <a:t>9/12/2022</a:t>
             </a:fld>
             <a:endParaRPr lang="en-US"/>
           </a:p>
@@ -3219,7 +3219,7 @@
           <a:p>
             <a:fld id="{8DDB1700-4475-4CBC-B86D-A53CA45E6D33}" type="datetimeFigureOut">
               <a:rPr lang="en-US" smtClean="0"/>
-              <a:t>8/22/2022</a:t>
+              <a:t>9/12/2022</a:t>
             </a:fld>
             <a:endParaRPr lang="en-US"/>
           </a:p>
@@ -3460,7 +3460,7 @@
           <a:p>
             <a:fld id="{8DDB1700-4475-4CBC-B86D-A53CA45E6D33}" type="datetimeFigureOut">
               <a:rPr lang="en-US" smtClean="0"/>
-              <a:t>8/22/2022</a:t>
+              <a:t>9/12/2022</a:t>
             </a:fld>
             <a:endParaRPr lang="en-US"/>
           </a:p>

</xml_diff>